<commit_message>
Basic index page and obliterate Autore
Autore was overkill, and not relevant to the project.
</commit_message>
<xml_diff>
--- a/Link_walkthrough_admin.pptx
+++ b/Link_walkthrough_admin.pptx
@@ -267,7 +267,7 @@
           <a:p>
             <a:fld id="{59DF24E0-BCDE-4769-BC83-AF210411CDE1}" type="datetimeFigureOut">
               <a:rPr lang="it-IT" smtClean="0"/>
-              <a:t>24/06/2024</a:t>
+              <a:t>26/06/2024</a:t>
             </a:fld>
             <a:endParaRPr lang="it-IT"/>
           </a:p>
@@ -467,7 +467,7 @@
           <a:p>
             <a:fld id="{59DF24E0-BCDE-4769-BC83-AF210411CDE1}" type="datetimeFigureOut">
               <a:rPr lang="it-IT" smtClean="0"/>
-              <a:t>24/06/2024</a:t>
+              <a:t>26/06/2024</a:t>
             </a:fld>
             <a:endParaRPr lang="it-IT"/>
           </a:p>
@@ -677,7 +677,7 @@
           <a:p>
             <a:fld id="{59DF24E0-BCDE-4769-BC83-AF210411CDE1}" type="datetimeFigureOut">
               <a:rPr lang="it-IT" smtClean="0"/>
-              <a:t>24/06/2024</a:t>
+              <a:t>26/06/2024</a:t>
             </a:fld>
             <a:endParaRPr lang="it-IT"/>
           </a:p>
@@ -877,7 +877,7 @@
           <a:p>
             <a:fld id="{59DF24E0-BCDE-4769-BC83-AF210411CDE1}" type="datetimeFigureOut">
               <a:rPr lang="it-IT" smtClean="0"/>
-              <a:t>24/06/2024</a:t>
+              <a:t>26/06/2024</a:t>
             </a:fld>
             <a:endParaRPr lang="it-IT"/>
           </a:p>
@@ -1153,7 +1153,7 @@
           <a:p>
             <a:fld id="{59DF24E0-BCDE-4769-BC83-AF210411CDE1}" type="datetimeFigureOut">
               <a:rPr lang="it-IT" smtClean="0"/>
-              <a:t>24/06/2024</a:t>
+              <a:t>26/06/2024</a:t>
             </a:fld>
             <a:endParaRPr lang="it-IT"/>
           </a:p>
@@ -1421,7 +1421,7 @@
           <a:p>
             <a:fld id="{59DF24E0-BCDE-4769-BC83-AF210411CDE1}" type="datetimeFigureOut">
               <a:rPr lang="it-IT" smtClean="0"/>
-              <a:t>24/06/2024</a:t>
+              <a:t>26/06/2024</a:t>
             </a:fld>
             <a:endParaRPr lang="it-IT"/>
           </a:p>
@@ -1836,7 +1836,7 @@
           <a:p>
             <a:fld id="{59DF24E0-BCDE-4769-BC83-AF210411CDE1}" type="datetimeFigureOut">
               <a:rPr lang="it-IT" smtClean="0"/>
-              <a:t>24/06/2024</a:t>
+              <a:t>26/06/2024</a:t>
             </a:fld>
             <a:endParaRPr lang="it-IT"/>
           </a:p>
@@ -1978,7 +1978,7 @@
           <a:p>
             <a:fld id="{59DF24E0-BCDE-4769-BC83-AF210411CDE1}" type="datetimeFigureOut">
               <a:rPr lang="it-IT" smtClean="0"/>
-              <a:t>24/06/2024</a:t>
+              <a:t>26/06/2024</a:t>
             </a:fld>
             <a:endParaRPr lang="it-IT"/>
           </a:p>
@@ -2091,7 +2091,7 @@
           <a:p>
             <a:fld id="{59DF24E0-BCDE-4769-BC83-AF210411CDE1}" type="datetimeFigureOut">
               <a:rPr lang="it-IT" smtClean="0"/>
-              <a:t>24/06/2024</a:t>
+              <a:t>26/06/2024</a:t>
             </a:fld>
             <a:endParaRPr lang="it-IT"/>
           </a:p>
@@ -2404,7 +2404,7 @@
           <a:p>
             <a:fld id="{59DF24E0-BCDE-4769-BC83-AF210411CDE1}" type="datetimeFigureOut">
               <a:rPr lang="it-IT" smtClean="0"/>
-              <a:t>24/06/2024</a:t>
+              <a:t>26/06/2024</a:t>
             </a:fld>
             <a:endParaRPr lang="it-IT"/>
           </a:p>
@@ -2693,7 +2693,7 @@
           <a:p>
             <a:fld id="{59DF24E0-BCDE-4769-BC83-AF210411CDE1}" type="datetimeFigureOut">
               <a:rPr lang="it-IT" smtClean="0"/>
-              <a:t>24/06/2024</a:t>
+              <a:t>26/06/2024</a:t>
             </a:fld>
             <a:endParaRPr lang="it-IT"/>
           </a:p>
@@ -2936,7 +2936,7 @@
           <a:p>
             <a:fld id="{59DF24E0-BCDE-4769-BC83-AF210411CDE1}" type="datetimeFigureOut">
               <a:rPr lang="it-IT" smtClean="0"/>
-              <a:t>24/06/2024</a:t>
+              <a:t>26/06/2024</a:t>
             </a:fld>
             <a:endParaRPr lang="it-IT"/>
           </a:p>
@@ -6357,218 +6357,6 @@
           </a:fontRef>
         </p:style>
       </p:cxnSp>
-      <p:sp>
-        <p:nvSpPr>
-          <p:cNvPr id="104" name="Rectangle 103">
-            <a:extLst>
-              <a:ext uri="{FF2B5EF4-FFF2-40B4-BE49-F238E27FC236}">
-                <a16:creationId xmlns:a16="http://schemas.microsoft.com/office/drawing/2014/main" id="{8CD3A7B3-B2E8-0077-BD4A-41DC5DE517BF}"/>
-              </a:ext>
-            </a:extLst>
-          </p:cNvPr>
-          <p:cNvSpPr/>
-          <p:nvPr/>
-        </p:nvSpPr>
-        <p:spPr>
-          <a:xfrm>
-            <a:off x="1646559" y="6258980"/>
-            <a:ext cx="1863764" cy="448017"/>
-          </a:xfrm>
-          <a:prstGeom prst="rect">
-            <a:avLst/>
-          </a:prstGeom>
-        </p:spPr>
-        <p:style>
-          <a:lnRef idx="2">
-            <a:schemeClr val="accent1">
-              <a:shade val="15000"/>
-            </a:schemeClr>
-          </a:lnRef>
-          <a:fillRef idx="1">
-            <a:schemeClr val="accent1"/>
-          </a:fillRef>
-          <a:effectRef idx="0">
-            <a:schemeClr val="accent1"/>
-          </a:effectRef>
-          <a:fontRef idx="minor">
-            <a:schemeClr val="lt1"/>
-          </a:fontRef>
-        </p:style>
-        <p:txBody>
-          <a:bodyPr rtlCol="0" anchor="ctr"/>
-          <a:lstStyle/>
-          <a:p>
-            <a:r>
-              <a:rPr lang="it-IT" sz="1200" dirty="0">
-                <a:solidFill>
-                  <a:schemeClr val="tx1"/>
-                </a:solidFill>
-              </a:rPr>
-              <a:t>Stessa cosa per gli autori</a:t>
-            </a:r>
-          </a:p>
-        </p:txBody>
-      </p:sp>
-      <p:cxnSp>
-        <p:nvCxnSpPr>
-          <p:cNvPr id="105" name="Straight Arrow Connector 104">
-            <a:extLst>
-              <a:ext uri="{FF2B5EF4-FFF2-40B4-BE49-F238E27FC236}">
-                <a16:creationId xmlns:a16="http://schemas.microsoft.com/office/drawing/2014/main" id="{DB59016D-F3F3-3D44-DB85-65ED534AC0FD}"/>
-              </a:ext>
-            </a:extLst>
-          </p:cNvPr>
-          <p:cNvCxnSpPr>
-            <a:cxnSpLocks/>
-          </p:cNvCxnSpPr>
-          <p:nvPr/>
-        </p:nvCxnSpPr>
-        <p:spPr>
-          <a:xfrm>
-            <a:off x="214990" y="1110874"/>
-            <a:ext cx="839" cy="5372114"/>
-          </a:xfrm>
-          <a:prstGeom prst="straightConnector1">
-            <a:avLst/>
-          </a:prstGeom>
-          <a:ln>
-            <a:tailEnd type="triangle"/>
-          </a:ln>
-        </p:spPr>
-        <p:style>
-          <a:lnRef idx="1">
-            <a:schemeClr val="accent1"/>
-          </a:lnRef>
-          <a:fillRef idx="0">
-            <a:schemeClr val="accent1"/>
-          </a:fillRef>
-          <a:effectRef idx="0">
-            <a:schemeClr val="accent1"/>
-          </a:effectRef>
-          <a:fontRef idx="minor">
-            <a:schemeClr val="tx1"/>
-          </a:fontRef>
-        </p:style>
-      </p:cxnSp>
-      <p:cxnSp>
-        <p:nvCxnSpPr>
-          <p:cNvPr id="108" name="Straight Arrow Connector 107">
-            <a:extLst>
-              <a:ext uri="{FF2B5EF4-FFF2-40B4-BE49-F238E27FC236}">
-                <a16:creationId xmlns:a16="http://schemas.microsoft.com/office/drawing/2014/main" id="{F7B9D202-24AB-4247-55C8-6576CD4133DE}"/>
-              </a:ext>
-            </a:extLst>
-          </p:cNvPr>
-          <p:cNvCxnSpPr>
-            <a:cxnSpLocks/>
-            <a:endCxn id="104" idx="1"/>
-          </p:cNvCxnSpPr>
-          <p:nvPr/>
-        </p:nvCxnSpPr>
-        <p:spPr>
-          <a:xfrm>
-            <a:off x="215829" y="6481119"/>
-            <a:ext cx="1430730" cy="1870"/>
-          </a:xfrm>
-          <a:prstGeom prst="straightConnector1">
-            <a:avLst/>
-          </a:prstGeom>
-          <a:ln>
-            <a:tailEnd type="triangle"/>
-          </a:ln>
-        </p:spPr>
-        <p:style>
-          <a:lnRef idx="1">
-            <a:schemeClr val="accent1"/>
-          </a:lnRef>
-          <a:fillRef idx="0">
-            <a:schemeClr val="accent1"/>
-          </a:fillRef>
-          <a:effectRef idx="0">
-            <a:schemeClr val="accent1"/>
-          </a:effectRef>
-          <a:fontRef idx="minor">
-            <a:schemeClr val="tx1"/>
-          </a:fontRef>
-        </p:style>
-      </p:cxnSp>
-      <p:cxnSp>
-        <p:nvCxnSpPr>
-          <p:cNvPr id="110" name="Straight Arrow Connector 109">
-            <a:extLst>
-              <a:ext uri="{FF2B5EF4-FFF2-40B4-BE49-F238E27FC236}">
-                <a16:creationId xmlns:a16="http://schemas.microsoft.com/office/drawing/2014/main" id="{40986258-33D3-0616-2F8C-D598294A05FA}"/>
-              </a:ext>
-            </a:extLst>
-          </p:cNvPr>
-          <p:cNvCxnSpPr>
-            <a:cxnSpLocks/>
-          </p:cNvCxnSpPr>
-          <p:nvPr/>
-        </p:nvCxnSpPr>
-        <p:spPr>
-          <a:xfrm flipH="1">
-            <a:off x="214990" y="1110874"/>
-            <a:ext cx="205139" cy="0"/>
-          </a:xfrm>
-          <a:prstGeom prst="straightConnector1">
-            <a:avLst/>
-          </a:prstGeom>
-          <a:ln>
-            <a:tailEnd type="triangle"/>
-          </a:ln>
-        </p:spPr>
-        <p:style>
-          <a:lnRef idx="1">
-            <a:schemeClr val="accent1"/>
-          </a:lnRef>
-          <a:fillRef idx="0">
-            <a:schemeClr val="accent1"/>
-          </a:fillRef>
-          <a:effectRef idx="0">
-            <a:schemeClr val="accent1"/>
-          </a:effectRef>
-          <a:fontRef idx="minor">
-            <a:schemeClr val="tx1"/>
-          </a:fontRef>
-        </p:style>
-      </p:cxnSp>
-      <p:sp>
-        <p:nvSpPr>
-          <p:cNvPr id="113" name="TextBox 112">
-            <a:extLst>
-              <a:ext uri="{FF2B5EF4-FFF2-40B4-BE49-F238E27FC236}">
-                <a16:creationId xmlns:a16="http://schemas.microsoft.com/office/drawing/2014/main" id="{8E1B84F0-6415-C05A-A2AA-53169F1415F0}"/>
-              </a:ext>
-            </a:extLst>
-          </p:cNvPr>
-          <p:cNvSpPr txBox="1"/>
-          <p:nvPr/>
-        </p:nvSpPr>
-        <p:spPr>
-          <a:xfrm>
-            <a:off x="143328" y="1663012"/>
-            <a:ext cx="386149" cy="246221"/>
-          </a:xfrm>
-          <a:prstGeom prst="rect">
-            <a:avLst/>
-          </a:prstGeom>
-          <a:noFill/>
-        </p:spPr>
-        <p:txBody>
-          <a:bodyPr wrap="square" rtlCol="0">
-            <a:spAutoFit/>
-          </a:bodyPr>
-          <a:lstStyle/>
-          <a:p>
-            <a:r>
-              <a:rPr lang="it-IT" sz="1000" dirty="0"/>
-              <a:t>GET</a:t>
-            </a:r>
-            <a:endParaRPr lang="it-IT" dirty="0"/>
-          </a:p>
-        </p:txBody>
-      </p:sp>
     </p:spTree>
     <p:extLst>
       <p:ext uri="{BB962C8B-B14F-4D97-AF65-F5344CB8AC3E}">

</xml_diff>

<commit_message>
Implement all 3 /elenco
</commit_message>
<xml_diff>
--- a/Link_walkthrough_admin.pptx
+++ b/Link_walkthrough_admin.pptx
@@ -3529,6 +3529,9 @@
           <a:prstGeom prst="rect">
             <a:avLst/>
           </a:prstGeom>
+          <a:solidFill>
+            <a:srgbClr val="00B050"/>
+          </a:solidFill>
         </p:spPr>
         <p:style>
           <a:lnRef idx="2">
@@ -3690,6 +3693,9 @@
           <a:prstGeom prst="rect">
             <a:avLst/>
           </a:prstGeom>
+          <a:solidFill>
+            <a:srgbClr val="00B050"/>
+          </a:solidFill>
         </p:spPr>
         <p:style>
           <a:lnRef idx="2">
@@ -3851,6 +3857,9 @@
           <a:prstGeom prst="rect">
             <a:avLst/>
           </a:prstGeom>
+          <a:solidFill>
+            <a:srgbClr val="00B050"/>
+          </a:solidFill>
         </p:spPr>
         <p:style>
           <a:lnRef idx="2">

</xml_diff>